<commit_message>
Acréscimo de slides sobre objetos GeneXus e definições de alguns deles
</commit_message>
<xml_diff>
--- a/Techweek2019.pptx
+++ b/Techweek2019.pptx
@@ -9,6 +9,10 @@
     <p:sldId id="257" r:id="rId3"/>
     <p:sldId id="258" r:id="rId4"/>
     <p:sldId id="259" r:id="rId5"/>
+    <p:sldId id="260" r:id="rId6"/>
+    <p:sldId id="263" r:id="rId7"/>
+    <p:sldId id="261" r:id="rId8"/>
+    <p:sldId id="262" r:id="rId9"/>
   </p:sldIdLst>
   <p:sldSz cx="12192000" cy="6858000"/>
   <p:notesSz cx="6858000" cy="9144000"/>
@@ -107,6 +111,11 @@
       </a:defRPr>
     </a:lvl9pPr>
   </p:defaultTextStyle>
+  <p:extLst>
+    <p:ext uri="{EFAFB233-063F-42B5-8137-9DF3F51BA10A}">
+      <p15:sldGuideLst xmlns:p15="http://schemas.microsoft.com/office/powerpoint/2012/main"/>
+    </p:ext>
+  </p:extLst>
 </p:presentation>
 </file>
 
@@ -6804,6 +6813,620 @@
 </p:sld>
 </file>
 
+<file path=ppt/slides/slide5.xml><?xml version="1.0" encoding="utf-8"?>
+<p:sld xmlns:a="http://schemas.openxmlformats.org/drawingml/2006/main" xmlns:r="http://schemas.openxmlformats.org/officeDocument/2006/relationships" xmlns:p="http://schemas.openxmlformats.org/presentationml/2006/main">
+  <p:cSld>
+    <p:spTree>
+      <p:nvGrpSpPr>
+        <p:cNvPr id="1" name=""/>
+        <p:cNvGrpSpPr/>
+        <p:nvPr/>
+      </p:nvGrpSpPr>
+      <p:grpSpPr>
+        <a:xfrm>
+          <a:off x="0" y="0"/>
+          <a:ext cx="0" cy="0"/>
+          <a:chOff x="0" y="0"/>
+          <a:chExt cx="0" cy="0"/>
+        </a:xfrm>
+      </p:grpSpPr>
+      <p:sp>
+        <p:nvSpPr>
+          <p:cNvPr id="2" name="Título 1">
+            <a:extLst>
+              <a:ext uri="{FF2B5EF4-FFF2-40B4-BE49-F238E27FC236}">
+                <a16:creationId xmlns:a16="http://schemas.microsoft.com/office/drawing/2014/main" id="{D3B41A0A-FEC1-4386-82E3-91A4B0D0E70C}"/>
+              </a:ext>
+            </a:extLst>
+          </p:cNvPr>
+          <p:cNvSpPr>
+            <a:spLocks noGrp="1"/>
+          </p:cNvSpPr>
+          <p:nvPr>
+            <p:ph type="title"/>
+          </p:nvPr>
+        </p:nvSpPr>
+        <p:spPr>
+          <a:xfrm>
+            <a:off x="677334" y="609600"/>
+            <a:ext cx="8596668" cy="722811"/>
+          </a:xfrm>
+        </p:spPr>
+        <p:txBody>
+          <a:bodyPr/>
+          <a:lstStyle/>
+          <a:p>
+            <a:r>
+              <a:rPr lang="pt-BR" dirty="0"/>
+              <a:t>Objetos GeneXus</a:t>
+            </a:r>
+          </a:p>
+        </p:txBody>
+      </p:sp>
+      <p:sp>
+        <p:nvSpPr>
+          <p:cNvPr id="3" name="Espaço Reservado para Conteúdo 2">
+            <a:extLst>
+              <a:ext uri="{FF2B5EF4-FFF2-40B4-BE49-F238E27FC236}">
+                <a16:creationId xmlns:a16="http://schemas.microsoft.com/office/drawing/2014/main" id="{CAFCFB6F-6204-48EB-A175-889A89E85B11}"/>
+              </a:ext>
+            </a:extLst>
+          </p:cNvPr>
+          <p:cNvSpPr>
+            <a:spLocks noGrp="1"/>
+          </p:cNvSpPr>
+          <p:nvPr>
+            <p:ph idx="1"/>
+          </p:nvPr>
+        </p:nvSpPr>
+        <p:spPr>
+          <a:xfrm>
+            <a:off x="677334" y="1435401"/>
+            <a:ext cx="8596668" cy="4382303"/>
+          </a:xfrm>
+        </p:spPr>
+        <p:txBody>
+          <a:bodyPr>
+            <a:normAutofit fontScale="92500" lnSpcReduction="10000"/>
+          </a:bodyPr>
+          <a:lstStyle/>
+          <a:p>
+            <a:r>
+              <a:rPr lang="pt-BR" dirty="0"/>
+              <a:t>Definições de propriedades, eventos, telas e regras similares, cada um com suas especificidades</a:t>
+            </a:r>
+          </a:p>
+          <a:p>
+            <a:r>
+              <a:rPr lang="pt-BR" dirty="0"/>
+              <a:t>Tipos de objetos</a:t>
+            </a:r>
+          </a:p>
+          <a:p>
+            <a:pPr lvl="1"/>
+            <a:r>
+              <a:rPr lang="pt-BR" dirty="0"/>
+              <a:t>Domínios</a:t>
+            </a:r>
+          </a:p>
+          <a:p>
+            <a:pPr lvl="1"/>
+            <a:r>
+              <a:rPr lang="pt-BR" dirty="0"/>
+              <a:t>Transações</a:t>
+            </a:r>
+          </a:p>
+          <a:p>
+            <a:pPr lvl="1"/>
+            <a:r>
+              <a:rPr lang="pt-BR" i="1" dirty="0"/>
+              <a:t>Web </a:t>
+            </a:r>
+            <a:r>
+              <a:rPr lang="pt-BR" i="1" dirty="0" err="1"/>
+              <a:t>Panels</a:t>
+            </a:r>
+            <a:endParaRPr lang="pt-BR" i="1" dirty="0"/>
+          </a:p>
+          <a:p>
+            <a:pPr lvl="1"/>
+            <a:r>
+              <a:rPr lang="pt-BR" i="1" dirty="0"/>
+              <a:t>Procedures</a:t>
+            </a:r>
+          </a:p>
+          <a:p>
+            <a:pPr lvl="1"/>
+            <a:r>
+              <a:rPr lang="pt-BR" dirty="0"/>
+              <a:t>Imagens</a:t>
+            </a:r>
+          </a:p>
+          <a:p>
+            <a:pPr lvl="1"/>
+            <a:r>
+              <a:rPr lang="pt-BR" dirty="0"/>
+              <a:t>Temas</a:t>
+            </a:r>
+          </a:p>
+          <a:p>
+            <a:pPr lvl="1"/>
+            <a:r>
+              <a:rPr lang="pt-BR" dirty="0"/>
+              <a:t>Gráficos</a:t>
+            </a:r>
+          </a:p>
+          <a:p>
+            <a:pPr lvl="1"/>
+            <a:r>
+              <a:rPr lang="pt-BR" dirty="0" err="1"/>
+              <a:t>SDTs</a:t>
+            </a:r>
+            <a:endParaRPr lang="pt-BR" dirty="0"/>
+          </a:p>
+          <a:p>
+            <a:pPr lvl="1"/>
+            <a:r>
+              <a:rPr lang="pt-BR" dirty="0"/>
+              <a:t>E muitos mais...</a:t>
+            </a:r>
+          </a:p>
+          <a:p>
+            <a:r>
+              <a:rPr lang="pt-BR" dirty="0"/>
+              <a:t>Objetos GeneXus não tem nenhuma correlação com Orientação a Objetos</a:t>
+            </a:r>
+          </a:p>
+          <a:p>
+            <a:endParaRPr lang="pt-BR" dirty="0"/>
+          </a:p>
+        </p:txBody>
+      </p:sp>
+    </p:spTree>
+    <p:extLst>
+      <p:ext uri="{BB962C8B-B14F-4D97-AF65-F5344CB8AC3E}">
+        <p14:creationId xmlns:p14="http://schemas.microsoft.com/office/powerpoint/2010/main" val="1168226438"/>
+      </p:ext>
+    </p:extLst>
+  </p:cSld>
+  <p:clrMapOvr>
+    <a:masterClrMapping/>
+  </p:clrMapOvr>
+</p:sld>
+</file>
+
+<file path=ppt/slides/slide6.xml><?xml version="1.0" encoding="utf-8"?>
+<p:sld xmlns:a="http://schemas.openxmlformats.org/drawingml/2006/main" xmlns:r="http://schemas.openxmlformats.org/officeDocument/2006/relationships" xmlns:p="http://schemas.openxmlformats.org/presentationml/2006/main">
+  <p:cSld>
+    <p:spTree>
+      <p:nvGrpSpPr>
+        <p:cNvPr id="1" name=""/>
+        <p:cNvGrpSpPr/>
+        <p:nvPr/>
+      </p:nvGrpSpPr>
+      <p:grpSpPr>
+        <a:xfrm>
+          <a:off x="0" y="0"/>
+          <a:ext cx="0" cy="0"/>
+          <a:chOff x="0" y="0"/>
+          <a:chExt cx="0" cy="0"/>
+        </a:xfrm>
+      </p:grpSpPr>
+      <p:sp>
+        <p:nvSpPr>
+          <p:cNvPr id="2" name="Título 1">
+            <a:extLst>
+              <a:ext uri="{FF2B5EF4-FFF2-40B4-BE49-F238E27FC236}">
+                <a16:creationId xmlns:a16="http://schemas.microsoft.com/office/drawing/2014/main" id="{4655E4EF-947B-401E-9836-983005879035}"/>
+              </a:ext>
+            </a:extLst>
+          </p:cNvPr>
+          <p:cNvSpPr>
+            <a:spLocks noGrp="1"/>
+          </p:cNvSpPr>
+          <p:nvPr>
+            <p:ph type="title"/>
+          </p:nvPr>
+        </p:nvSpPr>
+        <p:spPr/>
+        <p:txBody>
+          <a:bodyPr/>
+          <a:lstStyle/>
+          <a:p>
+            <a:r>
+              <a:rPr lang="pt-BR" dirty="0"/>
+              <a:t>Definições gerais para os objetos</a:t>
+            </a:r>
+          </a:p>
+        </p:txBody>
+      </p:sp>
+      <p:sp>
+        <p:nvSpPr>
+          <p:cNvPr id="3" name="Espaço Reservado para Conteúdo 2">
+            <a:extLst>
+              <a:ext uri="{FF2B5EF4-FFF2-40B4-BE49-F238E27FC236}">
+                <a16:creationId xmlns:a16="http://schemas.microsoft.com/office/drawing/2014/main" id="{C647BE43-BC2F-49B9-AC2E-FA7FC315AAF1}"/>
+              </a:ext>
+            </a:extLst>
+          </p:cNvPr>
+          <p:cNvSpPr>
+            <a:spLocks noGrp="1"/>
+          </p:cNvSpPr>
+          <p:nvPr>
+            <p:ph idx="1"/>
+          </p:nvPr>
+        </p:nvSpPr>
+        <p:spPr>
+          <a:xfrm>
+            <a:off x="677334" y="1435401"/>
+            <a:ext cx="8596668" cy="4408808"/>
+          </a:xfrm>
+        </p:spPr>
+        <p:txBody>
+          <a:bodyPr/>
+          <a:lstStyle/>
+          <a:p>
+            <a:r>
+              <a:rPr lang="pt-BR" dirty="0"/>
+              <a:t>Comum a diversos tipos de objetos:</a:t>
+            </a:r>
+          </a:p>
+          <a:p>
+            <a:pPr lvl="1"/>
+            <a:r>
+              <a:rPr lang="pt-BR" dirty="0"/>
+              <a:t>Aba “</a:t>
+            </a:r>
+            <a:r>
+              <a:rPr lang="pt-BR" dirty="0" err="1"/>
+              <a:t>Rules</a:t>
+            </a:r>
+            <a:r>
+              <a:rPr lang="pt-BR" dirty="0"/>
+              <a:t>”</a:t>
+            </a:r>
+          </a:p>
+          <a:p>
+            <a:pPr lvl="1"/>
+            <a:r>
+              <a:rPr lang="pt-BR" dirty="0"/>
+              <a:t>Aba “</a:t>
+            </a:r>
+            <a:r>
+              <a:rPr lang="pt-BR" dirty="0" err="1"/>
+              <a:t>Documentation</a:t>
+            </a:r>
+            <a:r>
+              <a:rPr lang="pt-BR" dirty="0"/>
+              <a:t>”</a:t>
+            </a:r>
+          </a:p>
+          <a:p>
+            <a:pPr lvl="1"/>
+            <a:r>
+              <a:rPr lang="pt-BR" dirty="0"/>
+              <a:t>Regra “</a:t>
+            </a:r>
+            <a:r>
+              <a:rPr lang="pt-BR" dirty="0" err="1"/>
+              <a:t>Parm</a:t>
+            </a:r>
+            <a:r>
+              <a:rPr lang="pt-BR" dirty="0"/>
+              <a:t>”</a:t>
+            </a:r>
+          </a:p>
+          <a:p>
+            <a:pPr lvl="1"/>
+            <a:r>
+              <a:rPr lang="pt-BR" dirty="0"/>
+              <a:t>No caso de </a:t>
+            </a:r>
+            <a:r>
+              <a:rPr lang="pt-BR" i="1" dirty="0"/>
+              <a:t>Web </a:t>
+            </a:r>
+            <a:r>
+              <a:rPr lang="pt-BR" i="1" dirty="0" err="1"/>
+              <a:t>Panels</a:t>
+            </a:r>
+            <a:r>
+              <a:rPr lang="pt-BR" i="1" dirty="0"/>
+              <a:t> </a:t>
+            </a:r>
+            <a:r>
+              <a:rPr lang="pt-BR" dirty="0"/>
+              <a:t>e </a:t>
+            </a:r>
+            <a:r>
+              <a:rPr lang="pt-BR" i="1" dirty="0"/>
+              <a:t>Procedures</a:t>
+            </a:r>
+            <a:r>
+              <a:rPr lang="pt-BR" dirty="0"/>
+              <a:t>, a aba “</a:t>
+            </a:r>
+            <a:r>
+              <a:rPr lang="pt-BR" dirty="0" err="1"/>
+              <a:t>Conditions</a:t>
+            </a:r>
+            <a:r>
+              <a:rPr lang="pt-BR" dirty="0"/>
+              <a:t>”</a:t>
+            </a:r>
+          </a:p>
+          <a:p>
+            <a:pPr lvl="1"/>
+            <a:r>
+              <a:rPr lang="pt-BR" dirty="0"/>
+              <a:t>Em transações</a:t>
+            </a:r>
+            <a:r>
+              <a:rPr lang="pt-BR" i="1" dirty="0"/>
+              <a:t> </a:t>
+            </a:r>
+            <a:r>
+              <a:rPr lang="pt-BR" dirty="0"/>
+              <a:t>e </a:t>
+            </a:r>
+            <a:r>
+              <a:rPr lang="pt-BR" i="1" dirty="0"/>
+              <a:t>Web </a:t>
+            </a:r>
+            <a:r>
+              <a:rPr lang="pt-BR" i="1" dirty="0" err="1"/>
+              <a:t>Panels</a:t>
+            </a:r>
+            <a:endParaRPr lang="pt-BR" i="1" dirty="0"/>
+          </a:p>
+          <a:p>
+            <a:pPr lvl="2"/>
+            <a:r>
+              <a:rPr lang="pt-BR" dirty="0"/>
+              <a:t>Habilitação de campos</a:t>
+            </a:r>
+          </a:p>
+          <a:p>
+            <a:pPr lvl="2"/>
+            <a:r>
+              <a:rPr lang="pt-BR" dirty="0"/>
+              <a:t>Regra “Prompt”</a:t>
+            </a:r>
+          </a:p>
+          <a:p>
+            <a:pPr lvl="1"/>
+            <a:r>
+              <a:rPr lang="pt-BR" dirty="0"/>
+              <a:t>Definição de variáveis baseadas em domínios</a:t>
+            </a:r>
+          </a:p>
+        </p:txBody>
+      </p:sp>
+    </p:spTree>
+    <p:extLst>
+      <p:ext uri="{BB962C8B-B14F-4D97-AF65-F5344CB8AC3E}">
+        <p14:creationId xmlns:p14="http://schemas.microsoft.com/office/powerpoint/2010/main" val="3177980186"/>
+      </p:ext>
+    </p:extLst>
+  </p:cSld>
+  <p:clrMapOvr>
+    <a:masterClrMapping/>
+  </p:clrMapOvr>
+</p:sld>
+</file>
+
+<file path=ppt/slides/slide7.xml><?xml version="1.0" encoding="utf-8"?>
+<p:sld xmlns:a="http://schemas.openxmlformats.org/drawingml/2006/main" xmlns:r="http://schemas.openxmlformats.org/officeDocument/2006/relationships" xmlns:p="http://schemas.openxmlformats.org/presentationml/2006/main">
+  <p:cSld>
+    <p:spTree>
+      <p:nvGrpSpPr>
+        <p:cNvPr id="1" name=""/>
+        <p:cNvGrpSpPr/>
+        <p:nvPr/>
+      </p:nvGrpSpPr>
+      <p:grpSpPr>
+        <a:xfrm>
+          <a:off x="0" y="0"/>
+          <a:ext cx="0" cy="0"/>
+          <a:chOff x="0" y="0"/>
+          <a:chExt cx="0" cy="0"/>
+        </a:xfrm>
+      </p:grpSpPr>
+      <p:sp>
+        <p:nvSpPr>
+          <p:cNvPr id="2" name="Título 1">
+            <a:extLst>
+              <a:ext uri="{FF2B5EF4-FFF2-40B4-BE49-F238E27FC236}">
+                <a16:creationId xmlns:a16="http://schemas.microsoft.com/office/drawing/2014/main" id="{A3A21370-FA9E-43B6-B97A-7185F2181826}"/>
+              </a:ext>
+            </a:extLst>
+          </p:cNvPr>
+          <p:cNvSpPr>
+            <a:spLocks noGrp="1"/>
+          </p:cNvSpPr>
+          <p:nvPr>
+            <p:ph type="title"/>
+          </p:nvPr>
+        </p:nvSpPr>
+        <p:spPr>
+          <a:xfrm>
+            <a:off x="677334" y="609600"/>
+            <a:ext cx="8596668" cy="722811"/>
+          </a:xfrm>
+        </p:spPr>
+        <p:txBody>
+          <a:bodyPr/>
+          <a:lstStyle/>
+          <a:p>
+            <a:r>
+              <a:rPr lang="pt-BR" dirty="0"/>
+              <a:t>Objetos GeneXus: Transações</a:t>
+            </a:r>
+          </a:p>
+        </p:txBody>
+      </p:sp>
+      <p:sp>
+        <p:nvSpPr>
+          <p:cNvPr id="3" name="Espaço Reservado para Conteúdo 2">
+            <a:extLst>
+              <a:ext uri="{FF2B5EF4-FFF2-40B4-BE49-F238E27FC236}">
+                <a16:creationId xmlns:a16="http://schemas.microsoft.com/office/drawing/2014/main" id="{9430121F-AF51-4D00-865B-C911EEC1CF35}"/>
+              </a:ext>
+            </a:extLst>
+          </p:cNvPr>
+          <p:cNvSpPr>
+            <a:spLocks noGrp="1"/>
+          </p:cNvSpPr>
+          <p:nvPr>
+            <p:ph idx="1"/>
+          </p:nvPr>
+        </p:nvSpPr>
+        <p:spPr/>
+        <p:txBody>
+          <a:bodyPr/>
+          <a:lstStyle/>
+          <a:p>
+            <a:r>
+              <a:rPr lang="pt-BR" dirty="0"/>
+              <a:t>Definem a estrutura do banco de dados a ser gerada</a:t>
+            </a:r>
+          </a:p>
+          <a:p>
+            <a:r>
+              <a:rPr lang="pt-BR" dirty="0"/>
+              <a:t>Definem regras para a entrada de dados</a:t>
+            </a:r>
+          </a:p>
+          <a:p>
+            <a:r>
+              <a:rPr lang="pt-BR" dirty="0"/>
+              <a:t>Definem o comportamento dos atributos do sistema (validações com expressões regulares, máscaras, </a:t>
+            </a:r>
+            <a:r>
+              <a:rPr lang="pt-BR" i="1" dirty="0"/>
+              <a:t>range </a:t>
+            </a:r>
+            <a:r>
+              <a:rPr lang="pt-BR" dirty="0"/>
+              <a:t>de valores, etc...)</a:t>
+            </a:r>
+          </a:p>
+        </p:txBody>
+      </p:sp>
+    </p:spTree>
+    <p:extLst>
+      <p:ext uri="{BB962C8B-B14F-4D97-AF65-F5344CB8AC3E}">
+        <p14:creationId xmlns:p14="http://schemas.microsoft.com/office/powerpoint/2010/main" val="229613350"/>
+      </p:ext>
+    </p:extLst>
+  </p:cSld>
+  <p:clrMapOvr>
+    <a:masterClrMapping/>
+  </p:clrMapOvr>
+</p:sld>
+</file>
+
+<file path=ppt/slides/slide8.xml><?xml version="1.0" encoding="utf-8"?>
+<p:sld xmlns:a="http://schemas.openxmlformats.org/drawingml/2006/main" xmlns:r="http://schemas.openxmlformats.org/officeDocument/2006/relationships" xmlns:p="http://schemas.openxmlformats.org/presentationml/2006/main">
+  <p:cSld>
+    <p:spTree>
+      <p:nvGrpSpPr>
+        <p:cNvPr id="1" name=""/>
+        <p:cNvGrpSpPr/>
+        <p:nvPr/>
+      </p:nvGrpSpPr>
+      <p:grpSpPr>
+        <a:xfrm>
+          <a:off x="0" y="0"/>
+          <a:ext cx="0" cy="0"/>
+          <a:chOff x="0" y="0"/>
+          <a:chExt cx="0" cy="0"/>
+        </a:xfrm>
+      </p:grpSpPr>
+      <p:sp>
+        <p:nvSpPr>
+          <p:cNvPr id="2" name="Título 1">
+            <a:extLst>
+              <a:ext uri="{FF2B5EF4-FFF2-40B4-BE49-F238E27FC236}">
+                <a16:creationId xmlns:a16="http://schemas.microsoft.com/office/drawing/2014/main" id="{530B3E37-74F3-43B5-8DAA-7C0735F27A1E}"/>
+              </a:ext>
+            </a:extLst>
+          </p:cNvPr>
+          <p:cNvSpPr>
+            <a:spLocks noGrp="1"/>
+          </p:cNvSpPr>
+          <p:nvPr>
+            <p:ph type="title"/>
+          </p:nvPr>
+        </p:nvSpPr>
+        <p:spPr/>
+        <p:txBody>
+          <a:bodyPr/>
+          <a:lstStyle/>
+          <a:p>
+            <a:r>
+              <a:rPr lang="pt-BR" dirty="0"/>
+              <a:t>Objetos GeneXus: </a:t>
+            </a:r>
+            <a:r>
+              <a:rPr lang="pt-BR" i="1" dirty="0"/>
+              <a:t>Web </a:t>
+            </a:r>
+            <a:r>
+              <a:rPr lang="pt-BR" i="1" dirty="0" err="1"/>
+              <a:t>Panels</a:t>
+            </a:r>
+            <a:endParaRPr lang="pt-BR" dirty="0"/>
+          </a:p>
+        </p:txBody>
+      </p:sp>
+      <p:sp>
+        <p:nvSpPr>
+          <p:cNvPr id="3" name="Espaço Reservado para Conteúdo 2">
+            <a:extLst>
+              <a:ext uri="{FF2B5EF4-FFF2-40B4-BE49-F238E27FC236}">
+                <a16:creationId xmlns:a16="http://schemas.microsoft.com/office/drawing/2014/main" id="{8A9782F4-EBF6-4435-9DDA-81E9E5DA3433}"/>
+              </a:ext>
+            </a:extLst>
+          </p:cNvPr>
+          <p:cNvSpPr>
+            <a:spLocks noGrp="1"/>
+          </p:cNvSpPr>
+          <p:nvPr>
+            <p:ph idx="1"/>
+          </p:nvPr>
+        </p:nvSpPr>
+        <p:spPr/>
+        <p:txBody>
+          <a:bodyPr/>
+          <a:lstStyle/>
+          <a:p>
+            <a:r>
+              <a:rPr lang="pt-BR" dirty="0"/>
+              <a:t>Definem as telas da aplicação</a:t>
+            </a:r>
+          </a:p>
+          <a:p>
+            <a:r>
+              <a:rPr lang="pt-BR" dirty="0"/>
+              <a:t>Usados para desenhar telas mais complexas do que as desenháveis com o formulário da transação</a:t>
+            </a:r>
+          </a:p>
+        </p:txBody>
+      </p:sp>
+    </p:spTree>
+    <p:extLst>
+      <p:ext uri="{BB962C8B-B14F-4D97-AF65-F5344CB8AC3E}">
+        <p14:creationId xmlns:p14="http://schemas.microsoft.com/office/powerpoint/2010/main" val="189512758"/>
+      </p:ext>
+    </p:extLst>
+  </p:cSld>
+  <p:clrMapOvr>
+    <a:masterClrMapping/>
+  </p:clrMapOvr>
+</p:sld>
+</file>
+
 <file path=ppt/theme/theme1.xml><?xml version="1.0" encoding="utf-8"?>
 <a:theme xmlns:a="http://schemas.openxmlformats.org/drawingml/2006/main" name="Facetado">
   <a:themeElements>

</xml_diff>

<commit_message>
Continuação da explicação sobre os objetos GeneXus!
</commit_message>
<xml_diff>
--- a/Techweek2019.pptx
+++ b/Techweek2019.pptx
@@ -19,6 +19,8 @@
     <p:sldId id="267" r:id="rId13"/>
     <p:sldId id="268" r:id="rId14"/>
     <p:sldId id="269" r:id="rId15"/>
+    <p:sldId id="271" r:id="rId16"/>
+    <p:sldId id="270" r:id="rId17"/>
   </p:sldIdLst>
   <p:sldSz cx="12192000" cy="6858000"/>
   <p:notesSz cx="6858000" cy="9144000"/>
@@ -847,7 +849,7 @@
           <a:p>
             <a:fld id="{A4B818D9-19C3-4AD2-9336-87D155945ED2}" type="datetimeFigureOut">
               <a:rPr lang="pt-BR" smtClean="0"/>
-              <a:t>14/05/2019</a:t>
+              <a:t>15/05/2019</a:t>
             </a:fld>
             <a:endParaRPr lang="pt-BR"/>
           </a:p>
@@ -1098,7 +1100,7 @@
           <a:p>
             <a:fld id="{A4B818D9-19C3-4AD2-9336-87D155945ED2}" type="datetimeFigureOut">
               <a:rPr lang="pt-BR" smtClean="0"/>
-              <a:t>14/05/2019</a:t>
+              <a:t>15/05/2019</a:t>
             </a:fld>
             <a:endParaRPr lang="pt-BR"/>
           </a:p>
@@ -1412,7 +1414,7 @@
           <a:p>
             <a:fld id="{A4B818D9-19C3-4AD2-9336-87D155945ED2}" type="datetimeFigureOut">
               <a:rPr lang="pt-BR" smtClean="0"/>
-              <a:t>14/05/2019</a:t>
+              <a:t>15/05/2019</a:t>
             </a:fld>
             <a:endParaRPr lang="pt-BR"/>
           </a:p>
@@ -1753,7 +1755,7 @@
           <a:p>
             <a:fld id="{A4B818D9-19C3-4AD2-9336-87D155945ED2}" type="datetimeFigureOut">
               <a:rPr lang="pt-BR" smtClean="0"/>
-              <a:t>14/05/2019</a:t>
+              <a:t>15/05/2019</a:t>
             </a:fld>
             <a:endParaRPr lang="pt-BR"/>
           </a:p>
@@ -2067,7 +2069,7 @@
           <a:p>
             <a:fld id="{A4B818D9-19C3-4AD2-9336-87D155945ED2}" type="datetimeFigureOut">
               <a:rPr lang="pt-BR" smtClean="0"/>
-              <a:t>14/05/2019</a:t>
+              <a:t>15/05/2019</a:t>
             </a:fld>
             <a:endParaRPr lang="pt-BR"/>
           </a:p>
@@ -2460,7 +2462,7 @@
           <a:p>
             <a:fld id="{A4B818D9-19C3-4AD2-9336-87D155945ED2}" type="datetimeFigureOut">
               <a:rPr lang="pt-BR" smtClean="0"/>
-              <a:t>14/05/2019</a:t>
+              <a:t>15/05/2019</a:t>
             </a:fld>
             <a:endParaRPr lang="pt-BR"/>
           </a:p>
@@ -2630,7 +2632,7 @@
           <a:p>
             <a:fld id="{A4B818D9-19C3-4AD2-9336-87D155945ED2}" type="datetimeFigureOut">
               <a:rPr lang="pt-BR" smtClean="0"/>
-              <a:t>14/05/2019</a:t>
+              <a:t>15/05/2019</a:t>
             </a:fld>
             <a:endParaRPr lang="pt-BR"/>
           </a:p>
@@ -2810,7 +2812,7 @@
           <a:p>
             <a:fld id="{A4B818D9-19C3-4AD2-9336-87D155945ED2}" type="datetimeFigureOut">
               <a:rPr lang="pt-BR" smtClean="0"/>
-              <a:t>14/05/2019</a:t>
+              <a:t>15/05/2019</a:t>
             </a:fld>
             <a:endParaRPr lang="pt-BR"/>
           </a:p>
@@ -2996,7 +2998,7 @@
           <a:p>
             <a:fld id="{A4B818D9-19C3-4AD2-9336-87D155945ED2}" type="datetimeFigureOut">
               <a:rPr lang="pt-BR" smtClean="0"/>
-              <a:t>14/05/2019</a:t>
+              <a:t>15/05/2019</a:t>
             </a:fld>
             <a:endParaRPr lang="pt-BR"/>
           </a:p>
@@ -3282,7 +3284,7 @@
           <a:p>
             <a:fld id="{A4B818D9-19C3-4AD2-9336-87D155945ED2}" type="datetimeFigureOut">
               <a:rPr lang="pt-BR" smtClean="0"/>
-              <a:t>14/05/2019</a:t>
+              <a:t>15/05/2019</a:t>
             </a:fld>
             <a:endParaRPr lang="pt-BR"/>
           </a:p>
@@ -3514,7 +3516,7 @@
           <a:p>
             <a:fld id="{A4B818D9-19C3-4AD2-9336-87D155945ED2}" type="datetimeFigureOut">
               <a:rPr lang="pt-BR" smtClean="0"/>
-              <a:t>14/05/2019</a:t>
+              <a:t>15/05/2019</a:t>
             </a:fld>
             <a:endParaRPr lang="pt-BR"/>
           </a:p>
@@ -3888,7 +3890,7 @@
           <a:p>
             <a:fld id="{A4B818D9-19C3-4AD2-9336-87D155945ED2}" type="datetimeFigureOut">
               <a:rPr lang="pt-BR" smtClean="0"/>
-              <a:t>14/05/2019</a:t>
+              <a:t>15/05/2019</a:t>
             </a:fld>
             <a:endParaRPr lang="pt-BR"/>
           </a:p>
@@ -4011,7 +4013,7 @@
           <a:p>
             <a:fld id="{A4B818D9-19C3-4AD2-9336-87D155945ED2}" type="datetimeFigureOut">
               <a:rPr lang="pt-BR" smtClean="0"/>
-              <a:t>14/05/2019</a:t>
+              <a:t>15/05/2019</a:t>
             </a:fld>
             <a:endParaRPr lang="pt-BR"/>
           </a:p>
@@ -4106,7 +4108,7 @@
           <a:p>
             <a:fld id="{A4B818D9-19C3-4AD2-9336-87D155945ED2}" type="datetimeFigureOut">
               <a:rPr lang="pt-BR" smtClean="0"/>
-              <a:t>14/05/2019</a:t>
+              <a:t>15/05/2019</a:t>
             </a:fld>
             <a:endParaRPr lang="pt-BR"/>
           </a:p>
@@ -4361,7 +4363,7 @@
           <a:p>
             <a:fld id="{A4B818D9-19C3-4AD2-9336-87D155945ED2}" type="datetimeFigureOut">
               <a:rPr lang="pt-BR" smtClean="0"/>
-              <a:t>14/05/2019</a:t>
+              <a:t>15/05/2019</a:t>
             </a:fld>
             <a:endParaRPr lang="pt-BR"/>
           </a:p>
@@ -4624,7 +4626,7 @@
           <a:p>
             <a:fld id="{A4B818D9-19C3-4AD2-9336-87D155945ED2}" type="datetimeFigureOut">
               <a:rPr lang="pt-BR" smtClean="0"/>
-              <a:t>14/05/2019</a:t>
+              <a:t>15/05/2019</a:t>
             </a:fld>
             <a:endParaRPr lang="pt-BR"/>
           </a:p>
@@ -5367,7 +5369,7 @@
           <a:p>
             <a:fld id="{A4B818D9-19C3-4AD2-9336-87D155945ED2}" type="datetimeFigureOut">
               <a:rPr lang="pt-BR" smtClean="0"/>
-              <a:t>14/05/2019</a:t>
+              <a:t>15/05/2019</a:t>
             </a:fld>
             <a:endParaRPr lang="pt-BR"/>
           </a:p>
@@ -6449,7 +6451,36 @@
           <a:bodyPr/>
           <a:lstStyle/>
           <a:p>
-            <a:endParaRPr lang="pt-BR"/>
+            <a:r>
+              <a:rPr lang="pt-BR" dirty="0"/>
+              <a:t>Definem instruções para manipulação de dados fora de formulários da transação</a:t>
+            </a:r>
+          </a:p>
+          <a:p>
+            <a:r>
+              <a:rPr lang="pt-BR" dirty="0"/>
+              <a:t>Validações de regras</a:t>
+            </a:r>
+          </a:p>
+          <a:p>
+            <a:r>
+              <a:rPr lang="pt-BR" dirty="0"/>
+              <a:t>Geram os relatórios do sistema</a:t>
+            </a:r>
+          </a:p>
+          <a:p>
+            <a:r>
+              <a:rPr lang="pt-BR" dirty="0"/>
+              <a:t>Utilizadas também para criar </a:t>
+            </a:r>
+            <a:r>
+              <a:rPr lang="pt-BR" i="1" dirty="0"/>
+              <a:t>Web Services </a:t>
+            </a:r>
+            <a:r>
+              <a:rPr lang="pt-BR" dirty="0"/>
+              <a:t>e executáveis</a:t>
+            </a:r>
           </a:p>
         </p:txBody>
       </p:sp>
@@ -6532,7 +6563,70 @@
           <a:bodyPr/>
           <a:lstStyle/>
           <a:p>
-            <a:endParaRPr lang="pt-BR"/>
+            <a:r>
+              <a:rPr lang="pt-BR" dirty="0"/>
+              <a:t>Objetos do tipo “</a:t>
+            </a:r>
+            <a:r>
+              <a:rPr lang="pt-BR" dirty="0" err="1"/>
+              <a:t>Image</a:t>
+            </a:r>
+            <a:r>
+              <a:rPr lang="pt-BR" dirty="0"/>
+              <a:t>”: utilizados para definir as imagens da aplicação</a:t>
+            </a:r>
+          </a:p>
+          <a:p>
+            <a:pPr lvl="1"/>
+            <a:r>
+              <a:rPr lang="pt-BR" dirty="0"/>
+              <a:t>Imagem Interna: Gera um arquivo físico dentro da aplicação</a:t>
+            </a:r>
+          </a:p>
+          <a:p>
+            <a:pPr lvl="1"/>
+            <a:r>
+              <a:rPr lang="pt-BR" dirty="0"/>
+              <a:t>Imagem Externa: Aponta para uma URL</a:t>
+            </a:r>
+          </a:p>
+          <a:p>
+            <a:r>
+              <a:rPr lang="pt-BR" dirty="0"/>
+              <a:t>Temas: Manipulação do CSS da aplicação</a:t>
+            </a:r>
+          </a:p>
+          <a:p>
+            <a:pPr lvl="1"/>
+            <a:r>
+              <a:rPr lang="pt-BR" dirty="0"/>
+              <a:t>Classes</a:t>
+            </a:r>
+          </a:p>
+          <a:p>
+            <a:pPr lvl="1"/>
+            <a:r>
+              <a:rPr lang="pt-BR" dirty="0"/>
+              <a:t>Paleta de Cores</a:t>
+            </a:r>
+          </a:p>
+          <a:p>
+            <a:pPr lvl="1"/>
+            <a:r>
+              <a:rPr lang="pt-BR" dirty="0"/>
+              <a:t>Fontes</a:t>
+            </a:r>
+          </a:p>
+          <a:p>
+            <a:pPr lvl="1"/>
+            <a:r>
+              <a:rPr lang="pt-BR" dirty="0" err="1"/>
+              <a:t>Tags</a:t>
+            </a:r>
+            <a:r>
+              <a:rPr lang="pt-BR" dirty="0"/>
+              <a:t> HTML</a:t>
+            </a:r>
           </a:p>
         </p:txBody>
       </p:sp>
@@ -6615,7 +6709,75 @@
           <a:bodyPr/>
           <a:lstStyle/>
           <a:p>
-            <a:endParaRPr lang="pt-BR"/>
+            <a:r>
+              <a:rPr lang="pt-BR" dirty="0"/>
+              <a:t>Servem para demonstrar dados em forma de gráficos ou tabelas dinâmicas</a:t>
+            </a:r>
+          </a:p>
+          <a:p>
+            <a:r>
+              <a:rPr lang="pt-BR" dirty="0"/>
+              <a:t>Gráficos geram Flash ou </a:t>
+            </a:r>
+            <a:r>
+              <a:rPr lang="pt-BR" dirty="0" err="1"/>
+              <a:t>Javascript</a:t>
+            </a:r>
+            <a:r>
+              <a:rPr lang="pt-BR" dirty="0"/>
+              <a:t>, utilizando </a:t>
+            </a:r>
+            <a:r>
+              <a:rPr lang="pt-BR" i="1" dirty="0" err="1"/>
+              <a:t>Highcharts</a:t>
+            </a:r>
+            <a:endParaRPr lang="pt-BR" i="1" dirty="0"/>
+          </a:p>
+          <a:p>
+            <a:r>
+              <a:rPr lang="pt-BR" dirty="0"/>
+              <a:t>Mediante estrutura definida, é gerada uma instrução SQL para busca dos dados</a:t>
+            </a:r>
+          </a:p>
+          <a:p>
+            <a:r>
+              <a:rPr lang="pt-BR" dirty="0"/>
+              <a:t>Gráficos</a:t>
+            </a:r>
+          </a:p>
+          <a:p>
+            <a:pPr lvl="1"/>
+            <a:r>
+              <a:rPr lang="pt-BR" dirty="0"/>
+              <a:t>Pizza</a:t>
+            </a:r>
+          </a:p>
+          <a:p>
+            <a:pPr lvl="1"/>
+            <a:r>
+              <a:rPr lang="pt-BR" dirty="0"/>
+              <a:t>Barras</a:t>
+            </a:r>
+          </a:p>
+          <a:p>
+            <a:pPr lvl="1"/>
+            <a:r>
+              <a:rPr lang="pt-BR" dirty="0"/>
+              <a:t>Linha</a:t>
+            </a:r>
+          </a:p>
+          <a:p>
+            <a:pPr lvl="1"/>
+            <a:r>
+              <a:rPr lang="pt-BR" dirty="0"/>
+              <a:t>E outros...</a:t>
+            </a:r>
+          </a:p>
+          <a:p>
+            <a:r>
+              <a:rPr lang="pt-BR" dirty="0"/>
+              <a:t>Troca em tempo de execução da visualização dos gráficos</a:t>
+            </a:r>
           </a:p>
         </p:txBody>
       </p:sp>
@@ -6700,10 +6862,53 @@
         </p:nvSpPr>
         <p:spPr/>
         <p:txBody>
-          <a:bodyPr/>
-          <a:lstStyle/>
-          <a:p>
-            <a:endParaRPr lang="pt-BR"/>
+          <a:bodyPr>
+            <a:normAutofit/>
+          </a:bodyPr>
+          <a:lstStyle/>
+          <a:p>
+            <a:r>
+              <a:rPr lang="pt-BR" sz="2400" i="1" dirty="0"/>
+              <a:t>Structured Data </a:t>
+            </a:r>
+            <a:r>
+              <a:rPr lang="pt-BR" sz="2400" i="1" dirty="0" err="1"/>
+              <a:t>Types</a:t>
+            </a:r>
+            <a:r>
+              <a:rPr lang="pt-BR" sz="2400" i="1" dirty="0"/>
+              <a:t>,</a:t>
+            </a:r>
+            <a:r>
+              <a:rPr lang="pt-BR" sz="2400" dirty="0"/>
+              <a:t> ou Tipos de Dados Estruturados</a:t>
+            </a:r>
+          </a:p>
+          <a:p>
+            <a:r>
+              <a:rPr lang="pt-BR" sz="2400" dirty="0"/>
+              <a:t>Similar ao </a:t>
+            </a:r>
+            <a:r>
+              <a:rPr lang="pt-BR" sz="2400" i="1" dirty="0" err="1"/>
+              <a:t>struct</a:t>
+            </a:r>
+            <a:r>
+              <a:rPr lang="pt-BR" sz="2400" dirty="0"/>
+              <a:t> do C++</a:t>
+            </a:r>
+          </a:p>
+          <a:p>
+            <a:r>
+              <a:rPr lang="pt-BR" sz="2400" dirty="0"/>
+              <a:t>Fácil manipulação de listas</a:t>
+            </a:r>
+          </a:p>
+          <a:p>
+            <a:r>
+              <a:rPr lang="pt-BR" sz="2400" dirty="0"/>
+              <a:t>Permite geração fácil de dados em formato JSON e XML</a:t>
+            </a:r>
           </a:p>
         </p:txBody>
       </p:sp>
@@ -6776,6 +6981,284 @@
     <p:extLst>
       <p:ext uri="{BB962C8B-B14F-4D97-AF65-F5344CB8AC3E}">
         <p14:creationId xmlns:p14="http://schemas.microsoft.com/office/powerpoint/2010/main" val="3584567852"/>
+      </p:ext>
+    </p:extLst>
+  </p:cSld>
+  <p:clrMapOvr>
+    <a:masterClrMapping/>
+  </p:clrMapOvr>
+</p:sld>
+</file>
+
+<file path=ppt/slides/slide15.xml><?xml version="1.0" encoding="utf-8"?>
+<p:sld xmlns:a="http://schemas.openxmlformats.org/drawingml/2006/main" xmlns:r="http://schemas.openxmlformats.org/officeDocument/2006/relationships" xmlns:p="http://schemas.openxmlformats.org/presentationml/2006/main">
+  <p:cSld>
+    <p:spTree>
+      <p:nvGrpSpPr>
+        <p:cNvPr id="1" name=""/>
+        <p:cNvGrpSpPr/>
+        <p:nvPr/>
+      </p:nvGrpSpPr>
+      <p:grpSpPr>
+        <a:xfrm>
+          <a:off x="0" y="0"/>
+          <a:ext cx="0" cy="0"/>
+          <a:chOff x="0" y="0"/>
+          <a:chExt cx="0" cy="0"/>
+        </a:xfrm>
+      </p:grpSpPr>
+      <p:sp>
+        <p:nvSpPr>
+          <p:cNvPr id="3" name="Título 2">
+            <a:extLst>
+              <a:ext uri="{FF2B5EF4-FFF2-40B4-BE49-F238E27FC236}">
+                <a16:creationId xmlns:a16="http://schemas.microsoft.com/office/drawing/2014/main" id="{32A9B528-177C-4731-ABA9-0FFF4B188C8A}"/>
+              </a:ext>
+            </a:extLst>
+          </p:cNvPr>
+          <p:cNvSpPr>
+            <a:spLocks noGrp="1"/>
+          </p:cNvSpPr>
+          <p:nvPr>
+            <p:ph type="title"/>
+          </p:nvPr>
+        </p:nvSpPr>
+        <p:spPr/>
+        <p:txBody>
+          <a:bodyPr/>
+          <a:lstStyle/>
+          <a:p>
+            <a:r>
+              <a:rPr lang="pt-BR" dirty="0"/>
+              <a:t>Outros produtos da </a:t>
+            </a:r>
+            <a:r>
+              <a:rPr lang="pt-BR" dirty="0" err="1"/>
+              <a:t>ARTech</a:t>
+            </a:r>
+            <a:endParaRPr lang="pt-BR" dirty="0"/>
+          </a:p>
+        </p:txBody>
+      </p:sp>
+      <p:sp>
+        <p:nvSpPr>
+          <p:cNvPr id="4" name="Espaço Reservado para Conteúdo 3">
+            <a:extLst>
+              <a:ext uri="{FF2B5EF4-FFF2-40B4-BE49-F238E27FC236}">
+                <a16:creationId xmlns:a16="http://schemas.microsoft.com/office/drawing/2014/main" id="{F74D51DC-CCF4-4F16-AA86-BB66E8FE2836}"/>
+              </a:ext>
+            </a:extLst>
+          </p:cNvPr>
+          <p:cNvSpPr>
+            <a:spLocks noGrp="1"/>
+          </p:cNvSpPr>
+          <p:nvPr>
+            <p:ph idx="1"/>
+          </p:nvPr>
+        </p:nvSpPr>
+        <p:spPr/>
+        <p:txBody>
+          <a:bodyPr>
+            <a:normAutofit/>
+          </a:bodyPr>
+          <a:lstStyle/>
+          <a:p>
+            <a:r>
+              <a:rPr lang="pt-BR" sz="2800" dirty="0" err="1"/>
+              <a:t>GXTest</a:t>
+            </a:r>
+            <a:endParaRPr lang="pt-BR" sz="2800" dirty="0"/>
+          </a:p>
+          <a:p>
+            <a:r>
+              <a:rPr lang="pt-BR" sz="2800" dirty="0" err="1"/>
+              <a:t>GXServer</a:t>
+            </a:r>
+            <a:endParaRPr lang="pt-BR" sz="2800" dirty="0"/>
+          </a:p>
+          <a:p>
+            <a:r>
+              <a:rPr lang="pt-BR" sz="2800" dirty="0" err="1"/>
+              <a:t>GXQuery</a:t>
+            </a:r>
+            <a:endParaRPr lang="pt-BR" sz="2800" dirty="0"/>
+          </a:p>
+          <a:p>
+            <a:r>
+              <a:rPr lang="pt-BR" sz="2800" dirty="0" err="1"/>
+              <a:t>GXPortal</a:t>
+            </a:r>
+            <a:endParaRPr lang="pt-BR" sz="2800" dirty="0"/>
+          </a:p>
+        </p:txBody>
+      </p:sp>
+    </p:spTree>
+    <p:extLst>
+      <p:ext uri="{BB962C8B-B14F-4D97-AF65-F5344CB8AC3E}">
+        <p14:creationId xmlns:p14="http://schemas.microsoft.com/office/powerpoint/2010/main" val="1721587164"/>
+      </p:ext>
+    </p:extLst>
+  </p:cSld>
+  <p:clrMapOvr>
+    <a:masterClrMapping/>
+  </p:clrMapOvr>
+</p:sld>
+</file>
+
+<file path=ppt/slides/slide16.xml><?xml version="1.0" encoding="utf-8"?>
+<p:sld xmlns:a="http://schemas.openxmlformats.org/drawingml/2006/main" xmlns:r="http://schemas.openxmlformats.org/officeDocument/2006/relationships" xmlns:p="http://schemas.openxmlformats.org/presentationml/2006/main">
+  <p:cSld>
+    <p:spTree>
+      <p:nvGrpSpPr>
+        <p:cNvPr id="1" name=""/>
+        <p:cNvGrpSpPr/>
+        <p:nvPr/>
+      </p:nvGrpSpPr>
+      <p:grpSpPr>
+        <a:xfrm>
+          <a:off x="0" y="0"/>
+          <a:ext cx="0" cy="0"/>
+          <a:chOff x="0" y="0"/>
+          <a:chExt cx="0" cy="0"/>
+        </a:xfrm>
+      </p:grpSpPr>
+      <p:sp>
+        <p:nvSpPr>
+          <p:cNvPr id="5" name="Título 4">
+            <a:extLst>
+              <a:ext uri="{FF2B5EF4-FFF2-40B4-BE49-F238E27FC236}">
+                <a16:creationId xmlns:a16="http://schemas.microsoft.com/office/drawing/2014/main" id="{4FE25B56-59AE-49BA-8F5D-AACC2FA3838C}"/>
+              </a:ext>
+            </a:extLst>
+          </p:cNvPr>
+          <p:cNvSpPr>
+            <a:spLocks noGrp="1"/>
+          </p:cNvSpPr>
+          <p:nvPr>
+            <p:ph type="title"/>
+          </p:nvPr>
+        </p:nvSpPr>
+        <p:spPr/>
+        <p:txBody>
+          <a:bodyPr/>
+          <a:lstStyle/>
+          <a:p>
+            <a:r>
+              <a:rPr lang="pt-BR" dirty="0"/>
+              <a:t>Outros recursos</a:t>
+            </a:r>
+          </a:p>
+        </p:txBody>
+      </p:sp>
+      <p:sp>
+        <p:nvSpPr>
+          <p:cNvPr id="6" name="Espaço Reservado para Conteúdo 5">
+            <a:extLst>
+              <a:ext uri="{FF2B5EF4-FFF2-40B4-BE49-F238E27FC236}">
+                <a16:creationId xmlns:a16="http://schemas.microsoft.com/office/drawing/2014/main" id="{E7E290A4-8C1F-435F-B181-D343CB2A0F1A}"/>
+              </a:ext>
+            </a:extLst>
+          </p:cNvPr>
+          <p:cNvSpPr>
+            <a:spLocks noGrp="1"/>
+          </p:cNvSpPr>
+          <p:nvPr>
+            <p:ph idx="1"/>
+          </p:nvPr>
+        </p:nvSpPr>
+        <p:spPr/>
+        <p:txBody>
+          <a:bodyPr>
+            <a:normAutofit/>
+          </a:bodyPr>
+          <a:lstStyle/>
+          <a:p>
+            <a:r>
+              <a:rPr lang="pt-BR" sz="2400" dirty="0"/>
+              <a:t>Responsividade: GeneXus e </a:t>
+            </a:r>
+            <a:r>
+              <a:rPr lang="pt-BR" sz="2400" dirty="0" err="1"/>
+              <a:t>Bootstrap</a:t>
+            </a:r>
+            <a:endParaRPr lang="pt-BR" sz="2400" dirty="0"/>
+          </a:p>
+          <a:p>
+            <a:r>
+              <a:rPr lang="pt-BR" sz="2400" dirty="0"/>
+              <a:t>Segurança</a:t>
+            </a:r>
+          </a:p>
+          <a:p>
+            <a:pPr lvl="1"/>
+            <a:r>
+              <a:rPr lang="pt-BR" sz="2000" dirty="0"/>
+              <a:t>SQL </a:t>
+            </a:r>
+            <a:r>
+              <a:rPr lang="pt-BR" sz="2000" dirty="0" err="1"/>
+              <a:t>Injection</a:t>
+            </a:r>
+            <a:r>
+              <a:rPr lang="pt-BR" sz="2000" dirty="0"/>
+              <a:t>: Consultas parametrizadas</a:t>
+            </a:r>
+          </a:p>
+          <a:p>
+            <a:pPr lvl="1"/>
+            <a:r>
+              <a:rPr lang="pt-BR" sz="2000" dirty="0"/>
+              <a:t>Checagem de modificação de dados somente leitura</a:t>
+            </a:r>
+          </a:p>
+          <a:p>
+            <a:pPr lvl="1"/>
+            <a:r>
+              <a:rPr lang="pt-BR" sz="2000" dirty="0"/>
+              <a:t>Criptografia de parâmetros das </a:t>
+            </a:r>
+            <a:r>
+              <a:rPr lang="pt-BR" sz="2000" dirty="0" err="1"/>
+              <a:t>URLs</a:t>
+            </a:r>
+            <a:r>
+              <a:rPr lang="pt-BR" sz="2000" dirty="0"/>
+              <a:t> da aplicação</a:t>
+            </a:r>
+          </a:p>
+          <a:p>
+            <a:r>
+              <a:rPr lang="pt-BR" sz="2400" dirty="0"/>
+              <a:t>Eventos </a:t>
+            </a:r>
+            <a:r>
+              <a:rPr lang="pt-BR" sz="2400" i="1" dirty="0" err="1"/>
+              <a:t>client-side</a:t>
+            </a:r>
+            <a:r>
+              <a:rPr lang="pt-BR" sz="2400" i="1" dirty="0"/>
+              <a:t> </a:t>
+            </a:r>
+            <a:r>
+              <a:rPr lang="pt-BR" sz="2400" dirty="0"/>
+              <a:t>e </a:t>
+            </a:r>
+            <a:r>
+              <a:rPr lang="pt-BR" sz="2400" i="1" dirty="0"/>
+              <a:t>server-</a:t>
+            </a:r>
+            <a:r>
+              <a:rPr lang="pt-BR" sz="2400" i="1" dirty="0" err="1"/>
+              <a:t>side</a:t>
+            </a:r>
+            <a:endParaRPr lang="pt-BR" sz="2400" dirty="0"/>
+          </a:p>
+        </p:txBody>
+      </p:sp>
+    </p:spTree>
+    <p:extLst>
+      <p:ext uri="{BB962C8B-B14F-4D97-AF65-F5344CB8AC3E}">
+        <p14:creationId xmlns:p14="http://schemas.microsoft.com/office/powerpoint/2010/main" val="2828832789"/>
       </p:ext>
     </p:extLst>
   </p:cSld>

</xml_diff>

<commit_message>
Adicionando notação sobre lista de navegação
</commit_message>
<xml_diff>
--- a/Techweek2019.pptx
+++ b/Techweek2019.pptx
@@ -8,8 +8,8 @@
     <p:sldId id="256" r:id="rId2"/>
     <p:sldId id="257" r:id="rId3"/>
     <p:sldId id="258" r:id="rId4"/>
-    <p:sldId id="259" r:id="rId5"/>
-    <p:sldId id="272" r:id="rId6"/>
+    <p:sldId id="272" r:id="rId5"/>
+    <p:sldId id="259" r:id="rId6"/>
     <p:sldId id="260" r:id="rId7"/>
     <p:sldId id="263" r:id="rId8"/>
     <p:sldId id="261" r:id="rId9"/>
@@ -851,7 +851,7 @@
           <a:p>
             <a:fld id="{A4B818D9-19C3-4AD2-9336-87D155945ED2}" type="datetimeFigureOut">
               <a:rPr lang="pt-BR" smtClean="0"/>
-              <a:t>15/05/2019</a:t>
+              <a:t>16/05/2019</a:t>
             </a:fld>
             <a:endParaRPr lang="pt-BR"/>
           </a:p>
@@ -1106,7 +1106,7 @@
           <a:p>
             <a:fld id="{A4B818D9-19C3-4AD2-9336-87D155945ED2}" type="datetimeFigureOut">
               <a:rPr lang="pt-BR" smtClean="0"/>
-              <a:t>15/05/2019</a:t>
+              <a:t>16/05/2019</a:t>
             </a:fld>
             <a:endParaRPr lang="pt-BR"/>
           </a:p>
@@ -1420,7 +1420,7 @@
           <a:p>
             <a:fld id="{A4B818D9-19C3-4AD2-9336-87D155945ED2}" type="datetimeFigureOut">
               <a:rPr lang="pt-BR" smtClean="0"/>
-              <a:t>15/05/2019</a:t>
+              <a:t>16/05/2019</a:t>
             </a:fld>
             <a:endParaRPr lang="pt-BR"/>
           </a:p>
@@ -1761,7 +1761,7 @@
           <a:p>
             <a:fld id="{A4B818D9-19C3-4AD2-9336-87D155945ED2}" type="datetimeFigureOut">
               <a:rPr lang="pt-BR" smtClean="0"/>
-              <a:t>15/05/2019</a:t>
+              <a:t>16/05/2019</a:t>
             </a:fld>
             <a:endParaRPr lang="pt-BR"/>
           </a:p>
@@ -2075,7 +2075,7 @@
           <a:p>
             <a:fld id="{A4B818D9-19C3-4AD2-9336-87D155945ED2}" type="datetimeFigureOut">
               <a:rPr lang="pt-BR" smtClean="0"/>
-              <a:t>15/05/2019</a:t>
+              <a:t>16/05/2019</a:t>
             </a:fld>
             <a:endParaRPr lang="pt-BR"/>
           </a:p>
@@ -2468,7 +2468,7 @@
           <a:p>
             <a:fld id="{A4B818D9-19C3-4AD2-9336-87D155945ED2}" type="datetimeFigureOut">
               <a:rPr lang="pt-BR" smtClean="0"/>
-              <a:t>15/05/2019</a:t>
+              <a:t>16/05/2019</a:t>
             </a:fld>
             <a:endParaRPr lang="pt-BR"/>
           </a:p>
@@ -2638,7 +2638,7 @@
           <a:p>
             <a:fld id="{A4B818D9-19C3-4AD2-9336-87D155945ED2}" type="datetimeFigureOut">
               <a:rPr lang="pt-BR" smtClean="0"/>
-              <a:t>15/05/2019</a:t>
+              <a:t>16/05/2019</a:t>
             </a:fld>
             <a:endParaRPr lang="pt-BR"/>
           </a:p>
@@ -2818,7 +2818,7 @@
           <a:p>
             <a:fld id="{A4B818D9-19C3-4AD2-9336-87D155945ED2}" type="datetimeFigureOut">
               <a:rPr lang="pt-BR" smtClean="0"/>
-              <a:t>15/05/2019</a:t>
+              <a:t>16/05/2019</a:t>
             </a:fld>
             <a:endParaRPr lang="pt-BR"/>
           </a:p>
@@ -3004,7 +3004,7 @@
           <a:p>
             <a:fld id="{A4B818D9-19C3-4AD2-9336-87D155945ED2}" type="datetimeFigureOut">
               <a:rPr lang="pt-BR" smtClean="0"/>
-              <a:t>15/05/2019</a:t>
+              <a:t>16/05/2019</a:t>
             </a:fld>
             <a:endParaRPr lang="pt-BR"/>
           </a:p>
@@ -3326,7 +3326,7 @@
           <a:p>
             <a:fld id="{A4B818D9-19C3-4AD2-9336-87D155945ED2}" type="datetimeFigureOut">
               <a:rPr lang="pt-BR" smtClean="0"/>
-              <a:t>15/05/2019</a:t>
+              <a:t>16/05/2019</a:t>
             </a:fld>
             <a:endParaRPr lang="pt-BR"/>
           </a:p>
@@ -3558,7 +3558,7 @@
           <a:p>
             <a:fld id="{A4B818D9-19C3-4AD2-9336-87D155945ED2}" type="datetimeFigureOut">
               <a:rPr lang="pt-BR" smtClean="0"/>
-              <a:t>15/05/2019</a:t>
+              <a:t>16/05/2019</a:t>
             </a:fld>
             <a:endParaRPr lang="pt-BR"/>
           </a:p>
@@ -3932,7 +3932,7 @@
           <a:p>
             <a:fld id="{A4B818D9-19C3-4AD2-9336-87D155945ED2}" type="datetimeFigureOut">
               <a:rPr lang="pt-BR" smtClean="0"/>
-              <a:t>15/05/2019</a:t>
+              <a:t>16/05/2019</a:t>
             </a:fld>
             <a:endParaRPr lang="pt-BR"/>
           </a:p>
@@ -4055,7 +4055,7 @@
           <a:p>
             <a:fld id="{A4B818D9-19C3-4AD2-9336-87D155945ED2}" type="datetimeFigureOut">
               <a:rPr lang="pt-BR" smtClean="0"/>
-              <a:t>15/05/2019</a:t>
+              <a:t>16/05/2019</a:t>
             </a:fld>
             <a:endParaRPr lang="pt-BR"/>
           </a:p>
@@ -4186,7 +4186,7 @@
           <a:p>
             <a:fld id="{A4B818D9-19C3-4AD2-9336-87D155945ED2}" type="datetimeFigureOut">
               <a:rPr lang="pt-BR" smtClean="0"/>
-              <a:t>15/05/2019</a:t>
+              <a:t>16/05/2019</a:t>
             </a:fld>
             <a:endParaRPr lang="pt-BR"/>
           </a:p>
@@ -4441,7 +4441,7 @@
           <a:p>
             <a:fld id="{A4B818D9-19C3-4AD2-9336-87D155945ED2}" type="datetimeFigureOut">
               <a:rPr lang="pt-BR" smtClean="0"/>
-              <a:t>15/05/2019</a:t>
+              <a:t>16/05/2019</a:t>
             </a:fld>
             <a:endParaRPr lang="pt-BR"/>
           </a:p>
@@ -4704,7 +4704,7 @@
           <a:p>
             <a:fld id="{A4B818D9-19C3-4AD2-9336-87D155945ED2}" type="datetimeFigureOut">
               <a:rPr lang="pt-BR" smtClean="0"/>
-              <a:t>15/05/2019</a:t>
+              <a:t>16/05/2019</a:t>
             </a:fld>
             <a:endParaRPr lang="pt-BR"/>
           </a:p>
@@ -5447,7 +5447,7 @@
           <a:p>
             <a:fld id="{A4B818D9-19C3-4AD2-9336-87D155945ED2}" type="datetimeFigureOut">
               <a:rPr lang="pt-BR" smtClean="0"/>
-              <a:t>15/05/2019</a:t>
+              <a:t>16/05/2019</a:t>
             </a:fld>
             <a:endParaRPr lang="pt-BR"/>
           </a:p>
@@ -7864,129 +7864,6 @@
       </p:grpSpPr>
       <p:sp>
         <p:nvSpPr>
-          <p:cNvPr id="2" name="Título 1">
-            <a:extLst>
-              <a:ext uri="{FF2B5EF4-FFF2-40B4-BE49-F238E27FC236}">
-                <a16:creationId xmlns:a16="http://schemas.microsoft.com/office/drawing/2014/main" id="{F4201046-A6C5-4988-9D48-A164228AB6C0}"/>
-              </a:ext>
-            </a:extLst>
-          </p:cNvPr>
-          <p:cNvSpPr>
-            <a:spLocks noGrp="1"/>
-          </p:cNvSpPr>
-          <p:nvPr>
-            <p:ph type="title"/>
-          </p:nvPr>
-        </p:nvSpPr>
-        <p:spPr/>
-        <p:txBody>
-          <a:bodyPr/>
-          <a:lstStyle/>
-          <a:p>
-            <a:r>
-              <a:rPr lang="pt-BR" dirty="0"/>
-              <a:t>Como funciona o GeneXus?</a:t>
-            </a:r>
-          </a:p>
-        </p:txBody>
-      </p:sp>
-      <p:sp>
-        <p:nvSpPr>
-          <p:cNvPr id="3" name="Espaço Reservado para Conteúdo 2">
-            <a:extLst>
-              <a:ext uri="{FF2B5EF4-FFF2-40B4-BE49-F238E27FC236}">
-                <a16:creationId xmlns:a16="http://schemas.microsoft.com/office/drawing/2014/main" id="{FEEF27D2-5411-4350-B922-7C3F8E33B77B}"/>
-              </a:ext>
-            </a:extLst>
-          </p:cNvPr>
-          <p:cNvSpPr>
-            <a:spLocks noGrp="1"/>
-          </p:cNvSpPr>
-          <p:nvPr>
-            <p:ph idx="1"/>
-          </p:nvPr>
-        </p:nvSpPr>
-        <p:spPr/>
-        <p:txBody>
-          <a:bodyPr>
-            <a:normAutofit lnSpcReduction="10000"/>
-          </a:bodyPr>
-          <a:lstStyle/>
-          <a:p>
-            <a:r>
-              <a:rPr lang="pt-BR" sz="3200" dirty="0"/>
-              <a:t>Processos</a:t>
-            </a:r>
-          </a:p>
-          <a:p>
-            <a:pPr lvl="1"/>
-            <a:r>
-              <a:rPr lang="pt-BR" sz="2800" dirty="0"/>
-              <a:t>Definição do conhecimento através dos objetos GeneXus</a:t>
-            </a:r>
-          </a:p>
-          <a:p>
-            <a:pPr lvl="1"/>
-            <a:r>
-              <a:rPr lang="pt-BR" sz="2800" dirty="0"/>
-              <a:t>Especificação</a:t>
-            </a:r>
-          </a:p>
-          <a:p>
-            <a:pPr lvl="1"/>
-            <a:r>
-              <a:rPr lang="pt-BR" sz="2800" dirty="0"/>
-              <a:t>Análise de impacto e alteração do banco de dados</a:t>
-            </a:r>
-          </a:p>
-          <a:p>
-            <a:pPr lvl="1"/>
-            <a:r>
-              <a:rPr lang="pt-BR" sz="2800" dirty="0"/>
-              <a:t>Geração</a:t>
-            </a:r>
-          </a:p>
-          <a:p>
-            <a:pPr lvl="1"/>
-            <a:r>
-              <a:rPr lang="pt-BR" sz="2800" dirty="0"/>
-              <a:t>Compilação</a:t>
-            </a:r>
-          </a:p>
-        </p:txBody>
-      </p:sp>
-    </p:spTree>
-    <p:extLst>
-      <p:ext uri="{BB962C8B-B14F-4D97-AF65-F5344CB8AC3E}">
-        <p14:creationId xmlns:p14="http://schemas.microsoft.com/office/powerpoint/2010/main" val="1700226088"/>
-      </p:ext>
-    </p:extLst>
-  </p:cSld>
-  <p:clrMapOvr>
-    <a:masterClrMapping/>
-  </p:clrMapOvr>
-</p:sld>
-</file>
-
-<file path=ppt/slides/slide5.xml><?xml version="1.0" encoding="utf-8"?>
-<p:sld xmlns:a="http://schemas.openxmlformats.org/drawingml/2006/main" xmlns:r="http://schemas.openxmlformats.org/officeDocument/2006/relationships" xmlns:p="http://schemas.openxmlformats.org/presentationml/2006/main">
-  <p:cSld>
-    <p:spTree>
-      <p:nvGrpSpPr>
-        <p:cNvPr id="1" name=""/>
-        <p:cNvGrpSpPr/>
-        <p:nvPr/>
-      </p:nvGrpSpPr>
-      <p:grpSpPr>
-        <a:xfrm>
-          <a:off x="0" y="0"/>
-          <a:ext cx="0" cy="0"/>
-          <a:chOff x="0" y="0"/>
-          <a:chExt cx="0" cy="0"/>
-        </a:xfrm>
-      </p:grpSpPr>
-      <p:sp>
-        <p:nvSpPr>
           <p:cNvPr id="4" name="Elipse 3">
             <a:extLst>
               <a:ext uri="{FF2B5EF4-FFF2-40B4-BE49-F238E27FC236}">
@@ -8397,6 +8274,141 @@
     <p:extLst>
       <p:ext uri="{BB962C8B-B14F-4D97-AF65-F5344CB8AC3E}">
         <p14:creationId xmlns:p14="http://schemas.microsoft.com/office/powerpoint/2010/main" val="4053677128"/>
+      </p:ext>
+    </p:extLst>
+  </p:cSld>
+  <p:clrMapOvr>
+    <a:masterClrMapping/>
+  </p:clrMapOvr>
+</p:sld>
+</file>
+
+<file path=ppt/slides/slide5.xml><?xml version="1.0" encoding="utf-8"?>
+<p:sld xmlns:a="http://schemas.openxmlformats.org/drawingml/2006/main" xmlns:r="http://schemas.openxmlformats.org/officeDocument/2006/relationships" xmlns:p="http://schemas.openxmlformats.org/presentationml/2006/main">
+  <p:cSld>
+    <p:spTree>
+      <p:nvGrpSpPr>
+        <p:cNvPr id="1" name=""/>
+        <p:cNvGrpSpPr/>
+        <p:nvPr/>
+      </p:nvGrpSpPr>
+      <p:grpSpPr>
+        <a:xfrm>
+          <a:off x="0" y="0"/>
+          <a:ext cx="0" cy="0"/>
+          <a:chOff x="0" y="0"/>
+          <a:chExt cx="0" cy="0"/>
+        </a:xfrm>
+      </p:grpSpPr>
+      <p:sp>
+        <p:nvSpPr>
+          <p:cNvPr id="2" name="Título 1">
+            <a:extLst>
+              <a:ext uri="{FF2B5EF4-FFF2-40B4-BE49-F238E27FC236}">
+                <a16:creationId xmlns:a16="http://schemas.microsoft.com/office/drawing/2014/main" id="{F4201046-A6C5-4988-9D48-A164228AB6C0}"/>
+              </a:ext>
+            </a:extLst>
+          </p:cNvPr>
+          <p:cNvSpPr>
+            <a:spLocks noGrp="1"/>
+          </p:cNvSpPr>
+          <p:nvPr>
+            <p:ph type="title"/>
+          </p:nvPr>
+        </p:nvSpPr>
+        <p:spPr/>
+        <p:txBody>
+          <a:bodyPr/>
+          <a:lstStyle/>
+          <a:p>
+            <a:r>
+              <a:rPr lang="pt-BR" dirty="0"/>
+              <a:t>Como funciona o GeneXus?</a:t>
+            </a:r>
+          </a:p>
+        </p:txBody>
+      </p:sp>
+      <p:sp>
+        <p:nvSpPr>
+          <p:cNvPr id="3" name="Espaço Reservado para Conteúdo 2">
+            <a:extLst>
+              <a:ext uri="{FF2B5EF4-FFF2-40B4-BE49-F238E27FC236}">
+                <a16:creationId xmlns:a16="http://schemas.microsoft.com/office/drawing/2014/main" id="{FEEF27D2-5411-4350-B922-7C3F8E33B77B}"/>
+              </a:ext>
+            </a:extLst>
+          </p:cNvPr>
+          <p:cNvSpPr>
+            <a:spLocks noGrp="1"/>
+          </p:cNvSpPr>
+          <p:nvPr>
+            <p:ph idx="1"/>
+          </p:nvPr>
+        </p:nvSpPr>
+        <p:spPr>
+          <a:xfrm>
+            <a:off x="677334" y="1435401"/>
+            <a:ext cx="8596668" cy="4276286"/>
+          </a:xfrm>
+        </p:spPr>
+        <p:txBody>
+          <a:bodyPr>
+            <a:normAutofit fontScale="92500"/>
+          </a:bodyPr>
+          <a:lstStyle/>
+          <a:p>
+            <a:r>
+              <a:rPr lang="pt-BR" sz="3200" dirty="0"/>
+              <a:t>Processos</a:t>
+            </a:r>
+          </a:p>
+          <a:p>
+            <a:pPr lvl="1"/>
+            <a:r>
+              <a:rPr lang="pt-BR" sz="2800" dirty="0"/>
+              <a:t>Definição do conhecimento através dos objetos GeneXus</a:t>
+            </a:r>
+          </a:p>
+          <a:p>
+            <a:pPr lvl="1"/>
+            <a:r>
+              <a:rPr lang="pt-BR" sz="2800" dirty="0"/>
+              <a:t>Especificação</a:t>
+            </a:r>
+          </a:p>
+          <a:p>
+            <a:pPr lvl="2"/>
+            <a:r>
+              <a:rPr lang="pt-BR" sz="2600" dirty="0"/>
+              <a:t>Lista de Navegação</a:t>
+            </a:r>
+          </a:p>
+          <a:p>
+            <a:pPr lvl="1"/>
+            <a:r>
+              <a:rPr lang="pt-BR" sz="2800" dirty="0"/>
+              <a:t>Análise de impacto e alteração do banco de dados</a:t>
+            </a:r>
+          </a:p>
+          <a:p>
+            <a:pPr lvl="1"/>
+            <a:r>
+              <a:rPr lang="pt-BR" sz="2800" dirty="0"/>
+              <a:t>Geração</a:t>
+            </a:r>
+          </a:p>
+          <a:p>
+            <a:pPr lvl="1"/>
+            <a:r>
+              <a:rPr lang="pt-BR" sz="2800" dirty="0"/>
+              <a:t>Compilação</a:t>
+            </a:r>
+          </a:p>
+        </p:txBody>
+      </p:sp>
+    </p:spTree>
+    <p:extLst>
+      <p:ext uri="{BB962C8B-B14F-4D97-AF65-F5344CB8AC3E}">
+        <p14:creationId xmlns:p14="http://schemas.microsoft.com/office/powerpoint/2010/main" val="1700226088"/>
       </p:ext>
     </p:extLst>
   </p:cSld>

</xml_diff>